<commit_message>
updating slides for fourth role and updated project guidelines
</commit_message>
<xml_diff>
--- a/ClassMaterials/CollisionHandling/Slides/Part2-ProjectReminders.pptx
+++ b/ClassMaterials/CollisionHandling/Slides/Part2-ProjectReminders.pptx
@@ -1567,7 +1567,7 @@
               <a:pPr>
                 <a:defRPr/>
               </a:pPr>
-              <a:t>Thursday, February 1, 2024</a:t>
+              <a:t>Sunday, May 4, 2025</a:t>
             </a:fld>
             <a:endParaRPr lang="en-US"/>
           </a:p>
@@ -5293,14 +5293,12 @@
 </file>
 
 <file path=customXml/item1.xml><?xml version="1.0" encoding="utf-8"?>
-<p:properties xmlns:p="http://schemas.microsoft.com/office/2006/metadata/properties" xmlns:xsi="http://www.w3.org/2001/XMLSchema-instance" xmlns:pc="http://schemas.microsoft.com/office/infopath/2007/PartnerControls">
-  <documentManagement>
-    <TaxCatchAll xmlns="820f9cb1-409d-4c4b-8197-1d4f7dd48124" xsi:nil="true"/>
-    <lcf76f155ced4ddcb4097134ff3c332f xmlns="08600313-7276-4ca7-b5d3-7d86193ee0ac">
-      <Terms xmlns="http://schemas.microsoft.com/office/infopath/2007/PartnerControls"/>
-    </lcf76f155ced4ddcb4097134ff3c332f>
-  </documentManagement>
-</p:properties>
+<?mso-contentType ?>
+<FormTemplates xmlns="http://schemas.microsoft.com/sharepoint/v3/contenttype/forms">
+  <Display>DocumentLibraryForm</Display>
+  <Edit>DocumentLibraryForm</Edit>
+  <New>DocumentLibraryForm</New>
+</FormTemplates>
 </file>
 
 <file path=customXml/item2.xml><?xml version="1.0" encoding="utf-8"?>
@@ -5481,21 +5479,20 @@
 </file>
 
 <file path=customXml/item3.xml><?xml version="1.0" encoding="utf-8"?>
-<?mso-contentType ?>
-<FormTemplates xmlns="http://schemas.microsoft.com/sharepoint/v3/contenttype/forms">
-  <Display>DocumentLibraryForm</Display>
-  <Edit>DocumentLibraryForm</Edit>
-  <New>DocumentLibraryForm</New>
-</FormTemplates>
+<p:properties xmlns:p="http://schemas.microsoft.com/office/2006/metadata/properties" xmlns:xsi="http://www.w3.org/2001/XMLSchema-instance" xmlns:pc="http://schemas.microsoft.com/office/infopath/2007/PartnerControls">
+  <documentManagement>
+    <TaxCatchAll xmlns="820f9cb1-409d-4c4b-8197-1d4f7dd48124" xsi:nil="true"/>
+    <lcf76f155ced4ddcb4097134ff3c332f xmlns="08600313-7276-4ca7-b5d3-7d86193ee0ac">
+      <Terms xmlns="http://schemas.microsoft.com/office/infopath/2007/PartnerControls"/>
+    </lcf76f155ced4ddcb4097134ff3c332f>
+  </documentManagement>
+</p:properties>
 </file>
 
 <file path=customXml/itemProps1.xml><?xml version="1.0" encoding="utf-8"?>
-<ds:datastoreItem xmlns:ds="http://schemas.openxmlformats.org/officeDocument/2006/customXml" ds:itemID="{5634EF7E-5EA3-49C2-BE7A-FEA82609F7D8}">
+<ds:datastoreItem xmlns:ds="http://schemas.openxmlformats.org/officeDocument/2006/customXml" ds:itemID="{3EBE5BB5-16D8-4951-9C8D-E0DF199895E2}">
   <ds:schemaRefs>
-    <ds:schemaRef ds:uri="http://schemas.microsoft.com/office/2006/metadata/properties"/>
-    <ds:schemaRef ds:uri="http://schemas.microsoft.com/office/infopath/2007/PartnerControls"/>
-    <ds:schemaRef ds:uri="820f9cb1-409d-4c4b-8197-1d4f7dd48124"/>
-    <ds:schemaRef ds:uri="08600313-7276-4ca7-b5d3-7d86193ee0ac"/>
+    <ds:schemaRef ds:uri="http://schemas.microsoft.com/sharepoint/v3/contenttype/forms"/>
   </ds:schemaRefs>
 </ds:datastoreItem>
 </file>
@@ -5520,9 +5517,12 @@
 </file>
 
 <file path=customXml/itemProps3.xml><?xml version="1.0" encoding="utf-8"?>
-<ds:datastoreItem xmlns:ds="http://schemas.openxmlformats.org/officeDocument/2006/customXml" ds:itemID="{3EBE5BB5-16D8-4951-9C8D-E0DF199895E2}">
+<ds:datastoreItem xmlns:ds="http://schemas.openxmlformats.org/officeDocument/2006/customXml" ds:itemID="{5634EF7E-5EA3-49C2-BE7A-FEA82609F7D8}">
   <ds:schemaRefs>
-    <ds:schemaRef ds:uri="http://schemas.microsoft.com/sharepoint/v3/contenttype/forms"/>
+    <ds:schemaRef ds:uri="http://schemas.microsoft.com/office/2006/metadata/properties"/>
+    <ds:schemaRef ds:uri="http://schemas.microsoft.com/office/infopath/2007/PartnerControls"/>
+    <ds:schemaRef ds:uri="820f9cb1-409d-4c4b-8197-1d4f7dd48124"/>
+    <ds:schemaRef ds:uri="08600313-7276-4ca7-b5d3-7d86193ee0ac"/>
   </ds:schemaRefs>
 </ds:datastoreItem>
 </file>
</xml_diff>